<commit_message>
corrected timeout in documents
changed timeout in dispatch in documents, images and relative files (waiter.qak)
</commit_message>
<xml_diff>
--- a/Sprint2_ISS2020/userDocs/images.pptx
+++ b/Sprint2_ISS2020/userDocs/images.pptx
@@ -269,7 +269,7 @@
           <a:p>
             <a:fld id="{E4248CD4-4C32-45E7-9F40-9E5F0D1EAF13}" type="datetimeFigureOut">
               <a:rPr lang="it-IT" smtClean="0"/>
-              <a:t>23/09/2020</a:t>
+              <a:t>30/09/2020</a:t>
             </a:fld>
             <a:endParaRPr lang="it-IT"/>
           </a:p>
@@ -467,7 +467,7 @@
           <a:p>
             <a:fld id="{E4248CD4-4C32-45E7-9F40-9E5F0D1EAF13}" type="datetimeFigureOut">
               <a:rPr lang="it-IT" smtClean="0"/>
-              <a:t>23/09/2020</a:t>
+              <a:t>30/09/2020</a:t>
             </a:fld>
             <a:endParaRPr lang="it-IT"/>
           </a:p>
@@ -675,7 +675,7 @@
           <a:p>
             <a:fld id="{E4248CD4-4C32-45E7-9F40-9E5F0D1EAF13}" type="datetimeFigureOut">
               <a:rPr lang="it-IT" smtClean="0"/>
-              <a:t>23/09/2020</a:t>
+              <a:t>30/09/2020</a:t>
             </a:fld>
             <a:endParaRPr lang="it-IT"/>
           </a:p>
@@ -873,7 +873,7 @@
           <a:p>
             <a:fld id="{E4248CD4-4C32-45E7-9F40-9E5F0D1EAF13}" type="datetimeFigureOut">
               <a:rPr lang="it-IT" smtClean="0"/>
-              <a:t>23/09/2020</a:t>
+              <a:t>30/09/2020</a:t>
             </a:fld>
             <a:endParaRPr lang="it-IT"/>
           </a:p>
@@ -1148,7 +1148,7 @@
           <a:p>
             <a:fld id="{E4248CD4-4C32-45E7-9F40-9E5F0D1EAF13}" type="datetimeFigureOut">
               <a:rPr lang="it-IT" smtClean="0"/>
-              <a:t>23/09/2020</a:t>
+              <a:t>30/09/2020</a:t>
             </a:fld>
             <a:endParaRPr lang="it-IT"/>
           </a:p>
@@ -1413,7 +1413,7 @@
           <a:p>
             <a:fld id="{E4248CD4-4C32-45E7-9F40-9E5F0D1EAF13}" type="datetimeFigureOut">
               <a:rPr lang="it-IT" smtClean="0"/>
-              <a:t>23/09/2020</a:t>
+              <a:t>30/09/2020</a:t>
             </a:fld>
             <a:endParaRPr lang="it-IT"/>
           </a:p>
@@ -1825,7 +1825,7 @@
           <a:p>
             <a:fld id="{E4248CD4-4C32-45E7-9F40-9E5F0D1EAF13}" type="datetimeFigureOut">
               <a:rPr lang="it-IT" smtClean="0"/>
-              <a:t>23/09/2020</a:t>
+              <a:t>30/09/2020</a:t>
             </a:fld>
             <a:endParaRPr lang="it-IT"/>
           </a:p>
@@ -1966,7 +1966,7 @@
           <a:p>
             <a:fld id="{E4248CD4-4C32-45E7-9F40-9E5F0D1EAF13}" type="datetimeFigureOut">
               <a:rPr lang="it-IT" smtClean="0"/>
-              <a:t>23/09/2020</a:t>
+              <a:t>30/09/2020</a:t>
             </a:fld>
             <a:endParaRPr lang="it-IT"/>
           </a:p>
@@ -2079,7 +2079,7 @@
           <a:p>
             <a:fld id="{E4248CD4-4C32-45E7-9F40-9E5F0D1EAF13}" type="datetimeFigureOut">
               <a:rPr lang="it-IT" smtClean="0"/>
-              <a:t>23/09/2020</a:t>
+              <a:t>30/09/2020</a:t>
             </a:fld>
             <a:endParaRPr lang="it-IT"/>
           </a:p>
@@ -2390,7 +2390,7 @@
           <a:p>
             <a:fld id="{E4248CD4-4C32-45E7-9F40-9E5F0D1EAF13}" type="datetimeFigureOut">
               <a:rPr lang="it-IT" smtClean="0"/>
-              <a:t>23/09/2020</a:t>
+              <a:t>30/09/2020</a:t>
             </a:fld>
             <a:endParaRPr lang="it-IT"/>
           </a:p>
@@ -2678,7 +2678,7 @@
           <a:p>
             <a:fld id="{E4248CD4-4C32-45E7-9F40-9E5F0D1EAF13}" type="datetimeFigureOut">
               <a:rPr lang="it-IT" smtClean="0"/>
-              <a:t>23/09/2020</a:t>
+              <a:t>30/09/2020</a:t>
             </a:fld>
             <a:endParaRPr lang="it-IT"/>
           </a:p>
@@ -2919,7 +2919,7 @@
           <a:p>
             <a:fld id="{E4248CD4-4C32-45E7-9F40-9E5F0D1EAF13}" type="datetimeFigureOut">
               <a:rPr lang="it-IT" smtClean="0"/>
-              <a:t>23/09/2020</a:t>
+              <a:t>30/09/2020</a:t>
             </a:fld>
             <a:endParaRPr lang="it-IT"/>
           </a:p>
@@ -14675,9 +14675,9 @@
         <p:grpSpPr>
           <a:xfrm>
             <a:off x="1219510" y="4500228"/>
-            <a:ext cx="3521166" cy="1632670"/>
+            <a:ext cx="3603451" cy="1632672"/>
             <a:chOff x="5713994" y="736792"/>
-            <a:chExt cx="5616419" cy="2604183"/>
+            <a:chExt cx="5747667" cy="2604185"/>
           </a:xfrm>
         </p:grpSpPr>
         <p:grpSp>
@@ -14694,10 +14694,10 @@
           </p:nvGrpSpPr>
           <p:grpSpPr>
             <a:xfrm>
-              <a:off x="5713994" y="1067750"/>
-              <a:ext cx="5616419" cy="2273225"/>
+              <a:off x="5713994" y="1067751"/>
+              <a:ext cx="5747667" cy="2273226"/>
               <a:chOff x="2818873" y="2310908"/>
-              <a:chExt cx="5522509" cy="2235216"/>
+              <a:chExt cx="5651562" cy="2235216"/>
             </a:xfrm>
           </p:grpSpPr>
           <p:grpSp>
@@ -15192,7 +15192,7 @@
             </p:nvSpPr>
             <p:spPr>
               <a:xfrm>
-                <a:off x="7267354" y="2991109"/>
+                <a:off x="7396407" y="3456697"/>
                 <a:ext cx="1074028" cy="434438"/>
               </a:xfrm>
               <a:prstGeom prst="rect">
@@ -19078,365 +19078,6 @@
           </a:prstGeom>
         </p:spPr>
       </p:pic>
-      <p:grpSp>
-        <p:nvGrpSpPr>
-          <p:cNvPr id="122" name="Gruppo 121">
-            <a:extLst>
-              <a:ext uri="{FF2B5EF4-FFF2-40B4-BE49-F238E27FC236}">
-                <a16:creationId xmlns:a16="http://schemas.microsoft.com/office/drawing/2014/main" id="{5D5A1B06-273A-45B6-B37B-305E560FF32A}"/>
-              </a:ext>
-            </a:extLst>
-          </p:cNvPr>
-          <p:cNvGrpSpPr/>
-          <p:nvPr/>
-        </p:nvGrpSpPr>
-        <p:grpSpPr>
-          <a:xfrm rot="18116225">
-            <a:off x="4146111" y="4844937"/>
-            <a:ext cx="553270" cy="157864"/>
-            <a:chOff x="6889671" y="708365"/>
-            <a:chExt cx="365153" cy="159063"/>
-          </a:xfrm>
-        </p:grpSpPr>
-        <p:sp>
-          <p:nvSpPr>
-            <p:cNvPr id="126" name="Figura a mano libera 41">
-              <a:extLst>
-                <a:ext uri="{FF2B5EF4-FFF2-40B4-BE49-F238E27FC236}">
-                  <a16:creationId xmlns:a16="http://schemas.microsoft.com/office/drawing/2014/main" id="{4CC50B40-AEC3-44B6-B875-00E2EB83CC95}"/>
-                </a:ext>
-              </a:extLst>
-            </p:cNvPr>
-            <p:cNvSpPr/>
-            <p:nvPr/>
-          </p:nvSpPr>
-          <p:spPr>
-            <a:xfrm>
-              <a:off x="6889671" y="708365"/>
-              <a:ext cx="365153" cy="159063"/>
-            </a:xfrm>
-            <a:custGeom>
-              <a:avLst/>
-              <a:gdLst>
-                <a:gd name="connsiteX0" fmla="*/ 0 w 342900"/>
-                <a:gd name="connsiteY0" fmla="*/ 142875 h 238125"/>
-                <a:gd name="connsiteX1" fmla="*/ 28575 w 342900"/>
-                <a:gd name="connsiteY1" fmla="*/ 38100 h 238125"/>
-                <a:gd name="connsiteX2" fmla="*/ 47625 w 342900"/>
-                <a:gd name="connsiteY2" fmla="*/ 9525 h 238125"/>
-                <a:gd name="connsiteX3" fmla="*/ 76200 w 342900"/>
-                <a:gd name="connsiteY3" fmla="*/ 0 h 238125"/>
-                <a:gd name="connsiteX4" fmla="*/ 104775 w 342900"/>
-                <a:gd name="connsiteY4" fmla="*/ 9525 h 238125"/>
-                <a:gd name="connsiteX5" fmla="*/ 142875 w 342900"/>
-                <a:gd name="connsiteY5" fmla="*/ 95250 h 238125"/>
-                <a:gd name="connsiteX6" fmla="*/ 161925 w 342900"/>
-                <a:gd name="connsiteY6" fmla="*/ 152400 h 238125"/>
-                <a:gd name="connsiteX7" fmla="*/ 171450 w 342900"/>
-                <a:gd name="connsiteY7" fmla="*/ 180975 h 238125"/>
-                <a:gd name="connsiteX8" fmla="*/ 209550 w 342900"/>
-                <a:gd name="connsiteY8" fmla="*/ 238125 h 238125"/>
-                <a:gd name="connsiteX9" fmla="*/ 238125 w 342900"/>
-                <a:gd name="connsiteY9" fmla="*/ 180975 h 238125"/>
-                <a:gd name="connsiteX10" fmla="*/ 266700 w 342900"/>
-                <a:gd name="connsiteY10" fmla="*/ 104775 h 238125"/>
-                <a:gd name="connsiteX11" fmla="*/ 342900 w 342900"/>
-                <a:gd name="connsiteY11" fmla="*/ 85725 h 238125"/>
-              </a:gdLst>
-              <a:ahLst/>
-              <a:cxnLst>
-                <a:cxn ang="0">
-                  <a:pos x="connsiteX0" y="connsiteY0"/>
-                </a:cxn>
-                <a:cxn ang="0">
-                  <a:pos x="connsiteX1" y="connsiteY1"/>
-                </a:cxn>
-                <a:cxn ang="0">
-                  <a:pos x="connsiteX2" y="connsiteY2"/>
-                </a:cxn>
-                <a:cxn ang="0">
-                  <a:pos x="connsiteX3" y="connsiteY3"/>
-                </a:cxn>
-                <a:cxn ang="0">
-                  <a:pos x="connsiteX4" y="connsiteY4"/>
-                </a:cxn>
-                <a:cxn ang="0">
-                  <a:pos x="connsiteX5" y="connsiteY5"/>
-                </a:cxn>
-                <a:cxn ang="0">
-                  <a:pos x="connsiteX6" y="connsiteY6"/>
-                </a:cxn>
-                <a:cxn ang="0">
-                  <a:pos x="connsiteX7" y="connsiteY7"/>
-                </a:cxn>
-                <a:cxn ang="0">
-                  <a:pos x="connsiteX8" y="connsiteY8"/>
-                </a:cxn>
-                <a:cxn ang="0">
-                  <a:pos x="connsiteX9" y="connsiteY9"/>
-                </a:cxn>
-                <a:cxn ang="0">
-                  <a:pos x="connsiteX10" y="connsiteY10"/>
-                </a:cxn>
-                <a:cxn ang="0">
-                  <a:pos x="connsiteX11" y="connsiteY11"/>
-                </a:cxn>
-              </a:cxnLst>
-              <a:rect l="l" t="t" r="r" b="b"/>
-              <a:pathLst>
-                <a:path w="342900" h="238125">
-                  <a:moveTo>
-                    <a:pt x="0" y="142875"/>
-                  </a:moveTo>
-                  <a:cubicBezTo>
-                    <a:pt x="5112" y="117315"/>
-                    <a:pt x="14764" y="58817"/>
-                    <a:pt x="28575" y="38100"/>
-                  </a:cubicBezTo>
-                  <a:cubicBezTo>
-                    <a:pt x="34925" y="28575"/>
-                    <a:pt x="38686" y="16676"/>
-                    <a:pt x="47625" y="9525"/>
-                  </a:cubicBezTo>
-                  <a:cubicBezTo>
-                    <a:pt x="55465" y="3253"/>
-                    <a:pt x="66675" y="3175"/>
-                    <a:pt x="76200" y="0"/>
-                  </a:cubicBezTo>
-                  <a:cubicBezTo>
-                    <a:pt x="85725" y="3175"/>
-                    <a:pt x="96935" y="3253"/>
-                    <a:pt x="104775" y="9525"/>
-                  </a:cubicBezTo>
-                  <a:cubicBezTo>
-                    <a:pt x="125358" y="25992"/>
-                    <a:pt x="137054" y="77787"/>
-                    <a:pt x="142875" y="95250"/>
-                  </a:cubicBezTo>
-                  <a:lnTo>
-                    <a:pt x="161925" y="152400"/>
-                  </a:lnTo>
-                  <a:cubicBezTo>
-                    <a:pt x="165100" y="161925"/>
-                    <a:pt x="169481" y="171130"/>
-                    <a:pt x="171450" y="180975"/>
-                  </a:cubicBezTo>
-                  <a:cubicBezTo>
-                    <a:pt x="182944" y="238445"/>
-                    <a:pt x="165616" y="223480"/>
-                    <a:pt x="209550" y="238125"/>
-                  </a:cubicBezTo>
-                  <a:cubicBezTo>
-                    <a:pt x="228174" y="210189"/>
-                    <a:pt x="230238" y="212523"/>
-                    <a:pt x="238125" y="180975"/>
-                  </a:cubicBezTo>
-                  <a:cubicBezTo>
-                    <a:pt x="243105" y="161054"/>
-                    <a:pt x="243471" y="119293"/>
-                    <a:pt x="266700" y="104775"/>
-                  </a:cubicBezTo>
-                  <a:cubicBezTo>
-                    <a:pt x="300393" y="83717"/>
-                    <a:pt x="313092" y="85725"/>
-                    <a:pt x="342900" y="85725"/>
-                  </a:cubicBezTo>
-                </a:path>
-              </a:pathLst>
-            </a:custGeom>
-            <a:noFill/>
-            <a:ln>
-              <a:solidFill>
-                <a:srgbClr val="C00000"/>
-              </a:solidFill>
-            </a:ln>
-          </p:spPr>
-          <p:style>
-            <a:lnRef idx="2">
-              <a:schemeClr val="accent1">
-                <a:shade val="50000"/>
-              </a:schemeClr>
-            </a:lnRef>
-            <a:fillRef idx="1">
-              <a:schemeClr val="accent1"/>
-            </a:fillRef>
-            <a:effectRef idx="0">
-              <a:schemeClr val="accent1"/>
-            </a:effectRef>
-            <a:fontRef idx="minor">
-              <a:schemeClr val="lt1"/>
-            </a:fontRef>
-          </p:style>
-          <p:txBody>
-            <a:bodyPr rtlCol="0" anchor="ctr"/>
-            <a:lstStyle/>
-            <a:p>
-              <a:pPr algn="ctr"/>
-              <a:endParaRPr lang="it-IT" sz="1000"/>
-            </a:p>
-          </p:txBody>
-        </p:sp>
-        <p:sp>
-          <p:nvSpPr>
-            <p:cNvPr id="127" name="Figura a mano libera 42">
-              <a:extLst>
-                <a:ext uri="{FF2B5EF4-FFF2-40B4-BE49-F238E27FC236}">
-                  <a16:creationId xmlns:a16="http://schemas.microsoft.com/office/drawing/2014/main" id="{6CEB4BB8-FCDA-497C-A46A-BF4B48AE23D1}"/>
-                </a:ext>
-              </a:extLst>
-            </p:cNvPr>
-            <p:cNvSpPr/>
-            <p:nvPr/>
-          </p:nvSpPr>
-          <p:spPr>
-            <a:xfrm>
-              <a:off x="7183822" y="731890"/>
-              <a:ext cx="71002" cy="25450"/>
-            </a:xfrm>
-            <a:custGeom>
-              <a:avLst/>
-              <a:gdLst>
-                <a:gd name="connsiteX0" fmla="*/ 66675 w 66675"/>
-                <a:gd name="connsiteY0" fmla="*/ 38100 h 38100"/>
-                <a:gd name="connsiteX1" fmla="*/ 0 w 66675"/>
-                <a:gd name="connsiteY1" fmla="*/ 0 h 38100"/>
-              </a:gdLst>
-              <a:ahLst/>
-              <a:cxnLst>
-                <a:cxn ang="0">
-                  <a:pos x="connsiteX0" y="connsiteY0"/>
-                </a:cxn>
-                <a:cxn ang="0">
-                  <a:pos x="connsiteX1" y="connsiteY1"/>
-                </a:cxn>
-              </a:cxnLst>
-              <a:rect l="l" t="t" r="r" b="b"/>
-              <a:pathLst>
-                <a:path w="66675" h="38100">
-                  <a:moveTo>
-                    <a:pt x="66675" y="38100"/>
-                  </a:moveTo>
-                  <a:cubicBezTo>
-                    <a:pt x="12962" y="5872"/>
-                    <a:pt x="35609" y="17804"/>
-                    <a:pt x="0" y="0"/>
-                  </a:cubicBezTo>
-                </a:path>
-              </a:pathLst>
-            </a:custGeom>
-            <a:noFill/>
-            <a:ln>
-              <a:solidFill>
-                <a:srgbClr val="C00000"/>
-              </a:solidFill>
-            </a:ln>
-          </p:spPr>
-          <p:style>
-            <a:lnRef idx="2">
-              <a:schemeClr val="accent1">
-                <a:shade val="50000"/>
-              </a:schemeClr>
-            </a:lnRef>
-            <a:fillRef idx="1">
-              <a:schemeClr val="accent1"/>
-            </a:fillRef>
-            <a:effectRef idx="0">
-              <a:schemeClr val="accent1"/>
-            </a:effectRef>
-            <a:fontRef idx="minor">
-              <a:schemeClr val="lt1"/>
-            </a:fontRef>
-          </p:style>
-          <p:txBody>
-            <a:bodyPr rtlCol="0" anchor="ctr"/>
-            <a:lstStyle/>
-            <a:p>
-              <a:pPr algn="ctr"/>
-              <a:endParaRPr lang="it-IT" sz="1000"/>
-            </a:p>
-          </p:txBody>
-        </p:sp>
-        <p:sp>
-          <p:nvSpPr>
-            <p:cNvPr id="128" name="Figura a mano libera 44">
-              <a:extLst>
-                <a:ext uri="{FF2B5EF4-FFF2-40B4-BE49-F238E27FC236}">
-                  <a16:creationId xmlns:a16="http://schemas.microsoft.com/office/drawing/2014/main" id="{A7EC30E5-9EAB-48AE-B075-D547F9ADD590}"/>
-                </a:ext>
-              </a:extLst>
-            </p:cNvPr>
-            <p:cNvSpPr/>
-            <p:nvPr/>
-          </p:nvSpPr>
-          <p:spPr>
-            <a:xfrm>
-              <a:off x="7204107" y="755409"/>
-              <a:ext cx="50716" cy="38175"/>
-            </a:xfrm>
-            <a:custGeom>
-              <a:avLst/>
-              <a:gdLst>
-                <a:gd name="connsiteX0" fmla="*/ 47625 w 47625"/>
-                <a:gd name="connsiteY0" fmla="*/ 0 h 57150"/>
-                <a:gd name="connsiteX1" fmla="*/ 0 w 47625"/>
-                <a:gd name="connsiteY1" fmla="*/ 57150 h 57150"/>
-              </a:gdLst>
-              <a:ahLst/>
-              <a:cxnLst>
-                <a:cxn ang="0">
-                  <a:pos x="connsiteX0" y="connsiteY0"/>
-                </a:cxn>
-                <a:cxn ang="0">
-                  <a:pos x="connsiteX1" y="connsiteY1"/>
-                </a:cxn>
-              </a:cxnLst>
-              <a:rect l="l" t="t" r="r" b="b"/>
-              <a:pathLst>
-                <a:path w="47625" h="57150">
-                  <a:moveTo>
-                    <a:pt x="47625" y="0"/>
-                  </a:moveTo>
-                  <a:cubicBezTo>
-                    <a:pt x="15397" y="53713"/>
-                    <a:pt x="35609" y="39346"/>
-                    <a:pt x="0" y="57150"/>
-                  </a:cubicBezTo>
-                </a:path>
-              </a:pathLst>
-            </a:custGeom>
-            <a:noFill/>
-            <a:ln>
-              <a:solidFill>
-                <a:srgbClr val="C00000"/>
-              </a:solidFill>
-            </a:ln>
-          </p:spPr>
-          <p:style>
-            <a:lnRef idx="2">
-              <a:schemeClr val="accent1">
-                <a:shade val="50000"/>
-              </a:schemeClr>
-            </a:lnRef>
-            <a:fillRef idx="1">
-              <a:schemeClr val="accent1"/>
-            </a:fillRef>
-            <a:effectRef idx="0">
-              <a:schemeClr val="accent1"/>
-            </a:effectRef>
-            <a:fontRef idx="minor">
-              <a:schemeClr val="lt1"/>
-            </a:fontRef>
-          </p:style>
-          <p:txBody>
-            <a:bodyPr rtlCol="0" anchor="ctr"/>
-            <a:lstStyle/>
-            <a:p>
-              <a:pPr algn="ctr"/>
-              <a:endParaRPr lang="it-IT" sz="1000"/>
-            </a:p>
-          </p:txBody>
-        </p:sp>
-      </p:grpSp>
       <p:sp>
         <p:nvSpPr>
           <p:cNvPr id="23" name="CasellaDiTesto 22">
@@ -19472,6 +19113,54 @@
           </a:p>
         </p:txBody>
       </p:sp>
+      <p:cxnSp>
+        <p:nvCxnSpPr>
+          <p:cNvPr id="129" name="Connettore a gomito 128">
+            <a:extLst>
+              <a:ext uri="{FF2B5EF4-FFF2-40B4-BE49-F238E27FC236}">
+                <a16:creationId xmlns:a16="http://schemas.microsoft.com/office/drawing/2014/main" id="{02B4CA4D-5C83-4C79-83A9-8317E546BD49}"/>
+              </a:ext>
+            </a:extLst>
+          </p:cNvPr>
+          <p:cNvCxnSpPr>
+            <a:cxnSpLocks/>
+            <a:stCxn id="28" idx="3"/>
+          </p:cNvCxnSpPr>
+          <p:nvPr/>
+        </p:nvCxnSpPr>
+        <p:spPr>
+          <a:xfrm flipV="1">
+            <a:off x="4101136" y="3172611"/>
+            <a:ext cx="511413" cy="2317513"/>
+          </a:xfrm>
+          <a:prstGeom prst="bentConnector2">
+            <a:avLst/>
+          </a:prstGeom>
+          <a:ln w="6350" cap="flat" cmpd="sng" algn="ctr">
+            <a:solidFill>
+              <a:schemeClr val="accent1"/>
+            </a:solidFill>
+            <a:prstDash val="dash"/>
+            <a:round/>
+            <a:headEnd type="none" w="med" len="med"/>
+            <a:tailEnd type="arrow" w="med" len="med"/>
+          </a:ln>
+        </p:spPr>
+        <p:style>
+          <a:lnRef idx="0">
+            <a:scrgbClr r="0" g="0" b="0"/>
+          </a:lnRef>
+          <a:fillRef idx="0">
+            <a:scrgbClr r="0" g="0" b="0"/>
+          </a:fillRef>
+          <a:effectRef idx="0">
+            <a:scrgbClr r="0" g="0" b="0"/>
+          </a:effectRef>
+          <a:fontRef idx="minor">
+            <a:schemeClr val="tx1"/>
+          </a:fontRef>
+        </p:style>
+      </p:cxnSp>
     </p:spTree>
     <p:extLst>
       <p:ext uri="{BB962C8B-B14F-4D97-AF65-F5344CB8AC3E}">

</xml_diff>

<commit_message>
added videos to sprint 2
</commit_message>
<xml_diff>
--- a/Sprint2_ISS2020/userDocs/images.pptx
+++ b/Sprint2_ISS2020/userDocs/images.pptx
@@ -269,7 +269,7 @@
           <a:p>
             <a:fld id="{E4248CD4-4C32-45E7-9F40-9E5F0D1EAF13}" type="datetimeFigureOut">
               <a:rPr lang="it-IT" smtClean="0"/>
-              <a:t>30/09/2020</a:t>
+              <a:t>01/10/2020</a:t>
             </a:fld>
             <a:endParaRPr lang="it-IT"/>
           </a:p>
@@ -467,7 +467,7 @@
           <a:p>
             <a:fld id="{E4248CD4-4C32-45E7-9F40-9E5F0D1EAF13}" type="datetimeFigureOut">
               <a:rPr lang="it-IT" smtClean="0"/>
-              <a:t>30/09/2020</a:t>
+              <a:t>01/10/2020</a:t>
             </a:fld>
             <a:endParaRPr lang="it-IT"/>
           </a:p>
@@ -675,7 +675,7 @@
           <a:p>
             <a:fld id="{E4248CD4-4C32-45E7-9F40-9E5F0D1EAF13}" type="datetimeFigureOut">
               <a:rPr lang="it-IT" smtClean="0"/>
-              <a:t>30/09/2020</a:t>
+              <a:t>01/10/2020</a:t>
             </a:fld>
             <a:endParaRPr lang="it-IT"/>
           </a:p>
@@ -873,7 +873,7 @@
           <a:p>
             <a:fld id="{E4248CD4-4C32-45E7-9F40-9E5F0D1EAF13}" type="datetimeFigureOut">
               <a:rPr lang="it-IT" smtClean="0"/>
-              <a:t>30/09/2020</a:t>
+              <a:t>01/10/2020</a:t>
             </a:fld>
             <a:endParaRPr lang="it-IT"/>
           </a:p>
@@ -1148,7 +1148,7 @@
           <a:p>
             <a:fld id="{E4248CD4-4C32-45E7-9F40-9E5F0D1EAF13}" type="datetimeFigureOut">
               <a:rPr lang="it-IT" smtClean="0"/>
-              <a:t>30/09/2020</a:t>
+              <a:t>01/10/2020</a:t>
             </a:fld>
             <a:endParaRPr lang="it-IT"/>
           </a:p>
@@ -1413,7 +1413,7 @@
           <a:p>
             <a:fld id="{E4248CD4-4C32-45E7-9F40-9E5F0D1EAF13}" type="datetimeFigureOut">
               <a:rPr lang="it-IT" smtClean="0"/>
-              <a:t>30/09/2020</a:t>
+              <a:t>01/10/2020</a:t>
             </a:fld>
             <a:endParaRPr lang="it-IT"/>
           </a:p>
@@ -1825,7 +1825,7 @@
           <a:p>
             <a:fld id="{E4248CD4-4C32-45E7-9F40-9E5F0D1EAF13}" type="datetimeFigureOut">
               <a:rPr lang="it-IT" smtClean="0"/>
-              <a:t>30/09/2020</a:t>
+              <a:t>01/10/2020</a:t>
             </a:fld>
             <a:endParaRPr lang="it-IT"/>
           </a:p>
@@ -1966,7 +1966,7 @@
           <a:p>
             <a:fld id="{E4248CD4-4C32-45E7-9F40-9E5F0D1EAF13}" type="datetimeFigureOut">
               <a:rPr lang="it-IT" smtClean="0"/>
-              <a:t>30/09/2020</a:t>
+              <a:t>01/10/2020</a:t>
             </a:fld>
             <a:endParaRPr lang="it-IT"/>
           </a:p>
@@ -2079,7 +2079,7 @@
           <a:p>
             <a:fld id="{E4248CD4-4C32-45E7-9F40-9E5F0D1EAF13}" type="datetimeFigureOut">
               <a:rPr lang="it-IT" smtClean="0"/>
-              <a:t>30/09/2020</a:t>
+              <a:t>01/10/2020</a:t>
             </a:fld>
             <a:endParaRPr lang="it-IT"/>
           </a:p>
@@ -2390,7 +2390,7 @@
           <a:p>
             <a:fld id="{E4248CD4-4C32-45E7-9F40-9E5F0D1EAF13}" type="datetimeFigureOut">
               <a:rPr lang="it-IT" smtClean="0"/>
-              <a:t>30/09/2020</a:t>
+              <a:t>01/10/2020</a:t>
             </a:fld>
             <a:endParaRPr lang="it-IT"/>
           </a:p>
@@ -2678,7 +2678,7 @@
           <a:p>
             <a:fld id="{E4248CD4-4C32-45E7-9F40-9E5F0D1EAF13}" type="datetimeFigureOut">
               <a:rPr lang="it-IT" smtClean="0"/>
-              <a:t>30/09/2020</a:t>
+              <a:t>01/10/2020</a:t>
             </a:fld>
             <a:endParaRPr lang="it-IT"/>
           </a:p>
@@ -2919,7 +2919,7 @@
           <a:p>
             <a:fld id="{E4248CD4-4C32-45E7-9F40-9E5F0D1EAF13}" type="datetimeFigureOut">
               <a:rPr lang="it-IT" smtClean="0"/>
-              <a:t>30/09/2020</a:t>
+              <a:t>01/10/2020</a:t>
             </a:fld>
             <a:endParaRPr lang="it-IT"/>
           </a:p>
@@ -11396,9 +11396,9 @@
         <p:grpSpPr>
           <a:xfrm>
             <a:off x="2818873" y="2310908"/>
-            <a:ext cx="5161965" cy="2235216"/>
+            <a:ext cx="5836499" cy="2235216"/>
             <a:chOff x="2818873" y="2310908"/>
-            <a:chExt cx="5161965" cy="2235216"/>
+            <a:chExt cx="5836499" cy="2235216"/>
           </a:xfrm>
         </p:grpSpPr>
         <p:grpSp>
@@ -11416,9 +11416,9 @@
           <p:grpSpPr>
             <a:xfrm>
               <a:off x="4194058" y="2310908"/>
-              <a:ext cx="3144284" cy="2235216"/>
+              <a:ext cx="3280940" cy="2235216"/>
               <a:chOff x="4194058" y="2310908"/>
-              <a:chExt cx="3144284" cy="2235216"/>
+              <a:chExt cx="3280940" cy="2235216"/>
             </a:xfrm>
           </p:grpSpPr>
           <p:sp>
@@ -11436,7 +11436,7 @@
             <p:spPr>
               <a:xfrm>
                 <a:off x="4756231" y="2529900"/>
-                <a:ext cx="2582111" cy="2016224"/>
+                <a:ext cx="2718767" cy="2016224"/>
               </a:xfrm>
               <a:prstGeom prst="roundRect">
                 <a:avLst/>
@@ -11893,7 +11893,7 @@
           </p:nvSpPr>
           <p:spPr>
             <a:xfrm>
-              <a:off x="7045967" y="3518738"/>
+              <a:off x="7720501" y="2987698"/>
               <a:ext cx="934871" cy="369332"/>
             </a:xfrm>
             <a:prstGeom prst="rect">
@@ -12010,365 +12010,48 @@
           </a:p>
         </p:txBody>
       </p:sp>
-      <p:grpSp>
-        <p:nvGrpSpPr>
-          <p:cNvPr id="23" name="Gruppo 22">
+      <p:cxnSp>
+        <p:nvCxnSpPr>
+          <p:cNvPr id="28" name="Connettore 2 27">
             <a:extLst>
               <a:ext uri="{FF2B5EF4-FFF2-40B4-BE49-F238E27FC236}">
-                <a16:creationId xmlns:a16="http://schemas.microsoft.com/office/drawing/2014/main" id="{6A531304-0290-402C-8946-97ADE948F116}"/>
+                <a16:creationId xmlns:a16="http://schemas.microsoft.com/office/drawing/2014/main" id="{E1E45293-267E-4A72-95C4-0BF90CD7FCBA}"/>
               </a:ext>
             </a:extLst>
           </p:cNvPr>
-          <p:cNvGrpSpPr/>
+          <p:cNvCxnSpPr>
+            <a:cxnSpLocks/>
+          </p:cNvCxnSpPr>
           <p:nvPr/>
-        </p:nvGrpSpPr>
-        <p:grpSpPr>
+        </p:nvCxnSpPr>
+        <p:spPr>
           <a:xfrm>
-            <a:off x="7181234" y="3339262"/>
-            <a:ext cx="592487" cy="258092"/>
-            <a:chOff x="5133975" y="5295900"/>
-            <a:chExt cx="342900" cy="238125"/>
+            <a:off x="7045967" y="3354044"/>
+            <a:ext cx="1361064" cy="0"/>
           </a:xfrm>
-        </p:grpSpPr>
-        <p:sp>
-          <p:nvSpPr>
-            <p:cNvPr id="25" name="Figura a mano libera 41">
-              <a:extLst>
-                <a:ext uri="{FF2B5EF4-FFF2-40B4-BE49-F238E27FC236}">
-                  <a16:creationId xmlns:a16="http://schemas.microsoft.com/office/drawing/2014/main" id="{E926267F-44C5-4A97-8453-DB6E1FAA2B68}"/>
-                </a:ext>
-              </a:extLst>
-            </p:cNvPr>
-            <p:cNvSpPr/>
-            <p:nvPr/>
-          </p:nvSpPr>
-          <p:spPr>
-            <a:xfrm>
-              <a:off x="5133975" y="5295900"/>
-              <a:ext cx="342900" cy="238125"/>
-            </a:xfrm>
-            <a:custGeom>
-              <a:avLst/>
-              <a:gdLst>
-                <a:gd name="connsiteX0" fmla="*/ 0 w 342900"/>
-                <a:gd name="connsiteY0" fmla="*/ 142875 h 238125"/>
-                <a:gd name="connsiteX1" fmla="*/ 28575 w 342900"/>
-                <a:gd name="connsiteY1" fmla="*/ 38100 h 238125"/>
-                <a:gd name="connsiteX2" fmla="*/ 47625 w 342900"/>
-                <a:gd name="connsiteY2" fmla="*/ 9525 h 238125"/>
-                <a:gd name="connsiteX3" fmla="*/ 76200 w 342900"/>
-                <a:gd name="connsiteY3" fmla="*/ 0 h 238125"/>
-                <a:gd name="connsiteX4" fmla="*/ 104775 w 342900"/>
-                <a:gd name="connsiteY4" fmla="*/ 9525 h 238125"/>
-                <a:gd name="connsiteX5" fmla="*/ 142875 w 342900"/>
-                <a:gd name="connsiteY5" fmla="*/ 95250 h 238125"/>
-                <a:gd name="connsiteX6" fmla="*/ 161925 w 342900"/>
-                <a:gd name="connsiteY6" fmla="*/ 152400 h 238125"/>
-                <a:gd name="connsiteX7" fmla="*/ 171450 w 342900"/>
-                <a:gd name="connsiteY7" fmla="*/ 180975 h 238125"/>
-                <a:gd name="connsiteX8" fmla="*/ 209550 w 342900"/>
-                <a:gd name="connsiteY8" fmla="*/ 238125 h 238125"/>
-                <a:gd name="connsiteX9" fmla="*/ 238125 w 342900"/>
-                <a:gd name="connsiteY9" fmla="*/ 180975 h 238125"/>
-                <a:gd name="connsiteX10" fmla="*/ 266700 w 342900"/>
-                <a:gd name="connsiteY10" fmla="*/ 104775 h 238125"/>
-                <a:gd name="connsiteX11" fmla="*/ 342900 w 342900"/>
-                <a:gd name="connsiteY11" fmla="*/ 85725 h 238125"/>
-              </a:gdLst>
-              <a:ahLst/>
-              <a:cxnLst>
-                <a:cxn ang="0">
-                  <a:pos x="connsiteX0" y="connsiteY0"/>
-                </a:cxn>
-                <a:cxn ang="0">
-                  <a:pos x="connsiteX1" y="connsiteY1"/>
-                </a:cxn>
-                <a:cxn ang="0">
-                  <a:pos x="connsiteX2" y="connsiteY2"/>
-                </a:cxn>
-                <a:cxn ang="0">
-                  <a:pos x="connsiteX3" y="connsiteY3"/>
-                </a:cxn>
-                <a:cxn ang="0">
-                  <a:pos x="connsiteX4" y="connsiteY4"/>
-                </a:cxn>
-                <a:cxn ang="0">
-                  <a:pos x="connsiteX5" y="connsiteY5"/>
-                </a:cxn>
-                <a:cxn ang="0">
-                  <a:pos x="connsiteX6" y="connsiteY6"/>
-                </a:cxn>
-                <a:cxn ang="0">
-                  <a:pos x="connsiteX7" y="connsiteY7"/>
-                </a:cxn>
-                <a:cxn ang="0">
-                  <a:pos x="connsiteX8" y="connsiteY8"/>
-                </a:cxn>
-                <a:cxn ang="0">
-                  <a:pos x="connsiteX9" y="connsiteY9"/>
-                </a:cxn>
-                <a:cxn ang="0">
-                  <a:pos x="connsiteX10" y="connsiteY10"/>
-                </a:cxn>
-                <a:cxn ang="0">
-                  <a:pos x="connsiteX11" y="connsiteY11"/>
-                </a:cxn>
-              </a:cxnLst>
-              <a:rect l="l" t="t" r="r" b="b"/>
-              <a:pathLst>
-                <a:path w="342900" h="238125">
-                  <a:moveTo>
-                    <a:pt x="0" y="142875"/>
-                  </a:moveTo>
-                  <a:cubicBezTo>
-                    <a:pt x="5112" y="117315"/>
-                    <a:pt x="14764" y="58817"/>
-                    <a:pt x="28575" y="38100"/>
-                  </a:cubicBezTo>
-                  <a:cubicBezTo>
-                    <a:pt x="34925" y="28575"/>
-                    <a:pt x="38686" y="16676"/>
-                    <a:pt x="47625" y="9525"/>
-                  </a:cubicBezTo>
-                  <a:cubicBezTo>
-                    <a:pt x="55465" y="3253"/>
-                    <a:pt x="66675" y="3175"/>
-                    <a:pt x="76200" y="0"/>
-                  </a:cubicBezTo>
-                  <a:cubicBezTo>
-                    <a:pt x="85725" y="3175"/>
-                    <a:pt x="96935" y="3253"/>
-                    <a:pt x="104775" y="9525"/>
-                  </a:cubicBezTo>
-                  <a:cubicBezTo>
-                    <a:pt x="125358" y="25992"/>
-                    <a:pt x="137054" y="77787"/>
-                    <a:pt x="142875" y="95250"/>
-                  </a:cubicBezTo>
-                  <a:lnTo>
-                    <a:pt x="161925" y="152400"/>
-                  </a:lnTo>
-                  <a:cubicBezTo>
-                    <a:pt x="165100" y="161925"/>
-                    <a:pt x="169481" y="171130"/>
-                    <a:pt x="171450" y="180975"/>
-                  </a:cubicBezTo>
-                  <a:cubicBezTo>
-                    <a:pt x="182944" y="238445"/>
-                    <a:pt x="165616" y="223480"/>
-                    <a:pt x="209550" y="238125"/>
-                  </a:cubicBezTo>
-                  <a:cubicBezTo>
-                    <a:pt x="228174" y="210189"/>
-                    <a:pt x="230238" y="212523"/>
-                    <a:pt x="238125" y="180975"/>
-                  </a:cubicBezTo>
-                  <a:cubicBezTo>
-                    <a:pt x="243105" y="161054"/>
-                    <a:pt x="243471" y="119293"/>
-                    <a:pt x="266700" y="104775"/>
-                  </a:cubicBezTo>
-                  <a:cubicBezTo>
-                    <a:pt x="300393" y="83717"/>
-                    <a:pt x="313092" y="85725"/>
-                    <a:pt x="342900" y="85725"/>
-                  </a:cubicBezTo>
-                </a:path>
-              </a:pathLst>
-            </a:custGeom>
-            <a:noFill/>
-            <a:ln>
-              <a:solidFill>
-                <a:srgbClr val="C00000"/>
-              </a:solidFill>
-            </a:ln>
-          </p:spPr>
-          <p:style>
-            <a:lnRef idx="2">
-              <a:schemeClr val="accent1">
-                <a:shade val="50000"/>
-              </a:schemeClr>
-            </a:lnRef>
-            <a:fillRef idx="1">
-              <a:schemeClr val="accent1"/>
-            </a:fillRef>
-            <a:effectRef idx="0">
-              <a:schemeClr val="accent1"/>
-            </a:effectRef>
-            <a:fontRef idx="minor">
-              <a:schemeClr val="lt1"/>
-            </a:fontRef>
-          </p:style>
-          <p:txBody>
-            <a:bodyPr rtlCol="0" anchor="ctr"/>
-            <a:lstStyle/>
-            <a:p>
-              <a:pPr algn="ctr"/>
-              <a:endParaRPr lang="it-IT"/>
-            </a:p>
-          </p:txBody>
-        </p:sp>
-        <p:sp>
-          <p:nvSpPr>
-            <p:cNvPr id="26" name="Figura a mano libera 42">
-              <a:extLst>
-                <a:ext uri="{FF2B5EF4-FFF2-40B4-BE49-F238E27FC236}">
-                  <a16:creationId xmlns:a16="http://schemas.microsoft.com/office/drawing/2014/main" id="{36E13040-DC95-4ECC-8677-08BB1B152241}"/>
-                </a:ext>
-              </a:extLst>
-            </p:cNvPr>
-            <p:cNvSpPr/>
-            <p:nvPr/>
-          </p:nvSpPr>
-          <p:spPr>
-            <a:xfrm>
-              <a:off x="5400675" y="5353050"/>
-              <a:ext cx="66675" cy="38100"/>
-            </a:xfrm>
-            <a:custGeom>
-              <a:avLst/>
-              <a:gdLst>
-                <a:gd name="connsiteX0" fmla="*/ 66675 w 66675"/>
-                <a:gd name="connsiteY0" fmla="*/ 38100 h 38100"/>
-                <a:gd name="connsiteX1" fmla="*/ 0 w 66675"/>
-                <a:gd name="connsiteY1" fmla="*/ 0 h 38100"/>
-              </a:gdLst>
-              <a:ahLst/>
-              <a:cxnLst>
-                <a:cxn ang="0">
-                  <a:pos x="connsiteX0" y="connsiteY0"/>
-                </a:cxn>
-                <a:cxn ang="0">
-                  <a:pos x="connsiteX1" y="connsiteY1"/>
-                </a:cxn>
-              </a:cxnLst>
-              <a:rect l="l" t="t" r="r" b="b"/>
-              <a:pathLst>
-                <a:path w="66675" h="38100">
-                  <a:moveTo>
-                    <a:pt x="66675" y="38100"/>
-                  </a:moveTo>
-                  <a:cubicBezTo>
-                    <a:pt x="12962" y="5872"/>
-                    <a:pt x="35609" y="17804"/>
-                    <a:pt x="0" y="0"/>
-                  </a:cubicBezTo>
-                </a:path>
-              </a:pathLst>
-            </a:custGeom>
-            <a:noFill/>
-            <a:ln>
-              <a:solidFill>
-                <a:srgbClr val="C00000"/>
-              </a:solidFill>
-            </a:ln>
-          </p:spPr>
-          <p:style>
-            <a:lnRef idx="2">
-              <a:schemeClr val="accent1">
-                <a:shade val="50000"/>
-              </a:schemeClr>
-            </a:lnRef>
-            <a:fillRef idx="1">
-              <a:schemeClr val="accent1"/>
-            </a:fillRef>
-            <a:effectRef idx="0">
-              <a:schemeClr val="accent1"/>
-            </a:effectRef>
-            <a:fontRef idx="minor">
-              <a:schemeClr val="lt1"/>
-            </a:fontRef>
-          </p:style>
-          <p:txBody>
-            <a:bodyPr rtlCol="0" anchor="ctr"/>
-            <a:lstStyle/>
-            <a:p>
-              <a:pPr algn="ctr"/>
-              <a:endParaRPr lang="it-IT"/>
-            </a:p>
-          </p:txBody>
-        </p:sp>
-        <p:sp>
-          <p:nvSpPr>
-            <p:cNvPr id="27" name="Figura a mano libera 44">
-              <a:extLst>
-                <a:ext uri="{FF2B5EF4-FFF2-40B4-BE49-F238E27FC236}">
-                  <a16:creationId xmlns:a16="http://schemas.microsoft.com/office/drawing/2014/main" id="{B9B9A730-2034-4BFF-9410-986339705EE0}"/>
-                </a:ext>
-              </a:extLst>
-            </p:cNvPr>
-            <p:cNvSpPr/>
-            <p:nvPr/>
-          </p:nvSpPr>
-          <p:spPr>
-            <a:xfrm>
-              <a:off x="5419725" y="5381625"/>
-              <a:ext cx="47625" cy="57150"/>
-            </a:xfrm>
-            <a:custGeom>
-              <a:avLst/>
-              <a:gdLst>
-                <a:gd name="connsiteX0" fmla="*/ 47625 w 47625"/>
-                <a:gd name="connsiteY0" fmla="*/ 0 h 57150"/>
-                <a:gd name="connsiteX1" fmla="*/ 0 w 47625"/>
-                <a:gd name="connsiteY1" fmla="*/ 57150 h 57150"/>
-              </a:gdLst>
-              <a:ahLst/>
-              <a:cxnLst>
-                <a:cxn ang="0">
-                  <a:pos x="connsiteX0" y="connsiteY0"/>
-                </a:cxn>
-                <a:cxn ang="0">
-                  <a:pos x="connsiteX1" y="connsiteY1"/>
-                </a:cxn>
-              </a:cxnLst>
-              <a:rect l="l" t="t" r="r" b="b"/>
-              <a:pathLst>
-                <a:path w="47625" h="57150">
-                  <a:moveTo>
-                    <a:pt x="47625" y="0"/>
-                  </a:moveTo>
-                  <a:cubicBezTo>
-                    <a:pt x="15397" y="53713"/>
-                    <a:pt x="35609" y="39346"/>
-                    <a:pt x="0" y="57150"/>
-                  </a:cubicBezTo>
-                </a:path>
-              </a:pathLst>
-            </a:custGeom>
-            <a:noFill/>
-            <a:ln>
-              <a:solidFill>
-                <a:srgbClr val="C00000"/>
-              </a:solidFill>
-            </a:ln>
-          </p:spPr>
-          <p:style>
-            <a:lnRef idx="2">
-              <a:schemeClr val="accent1">
-                <a:shade val="50000"/>
-              </a:schemeClr>
-            </a:lnRef>
-            <a:fillRef idx="1">
-              <a:schemeClr val="accent1"/>
-            </a:fillRef>
-            <a:effectRef idx="0">
-              <a:schemeClr val="accent1"/>
-            </a:effectRef>
-            <a:fontRef idx="minor">
-              <a:schemeClr val="lt1"/>
-            </a:fontRef>
-          </p:style>
-          <p:txBody>
-            <a:bodyPr rtlCol="0" anchor="ctr"/>
-            <a:lstStyle/>
-            <a:p>
-              <a:pPr algn="ctr"/>
-              <a:endParaRPr lang="it-IT"/>
-            </a:p>
-          </p:txBody>
-        </p:sp>
-      </p:grpSp>
+          <a:prstGeom prst="straightConnector1">
+            <a:avLst/>
+          </a:prstGeom>
+          <a:ln>
+            <a:prstDash val="lgDash"/>
+            <a:tailEnd type="arrow"/>
+          </a:ln>
+        </p:spPr>
+        <p:style>
+          <a:lnRef idx="1">
+            <a:schemeClr val="accent1"/>
+          </a:lnRef>
+          <a:fillRef idx="0">
+            <a:schemeClr val="accent1"/>
+          </a:fillRef>
+          <a:effectRef idx="0">
+            <a:schemeClr val="accent1"/>
+          </a:effectRef>
+          <a:fontRef idx="minor">
+            <a:schemeClr val="tx1"/>
+          </a:fontRef>
+        </p:style>
+      </p:cxnSp>
     </p:spTree>
     <p:extLst>
       <p:ext uri="{BB962C8B-B14F-4D97-AF65-F5344CB8AC3E}">

</xml_diff>